<commit_message>
updated.. some wrong 0 fill values
</commit_message>
<xml_diff>
--- a/test_presentation.pptx
+++ b/test_presentation.pptx
@@ -134,7 +134,7 @@
 <file path=ppt/revisionInfo.xml><?xml version="1.0" encoding="utf-8"?>
 <p1510:revInfo xmlns:a="http://schemas.openxmlformats.org/drawingml/2006/main" xmlns:r="http://schemas.openxmlformats.org/officeDocument/2006/relationships" xmlns:p1510="http://schemas.microsoft.com/office/powerpoint/2015/10/main">
   <p1510:revLst>
-    <p1510:client id="{041D70CF-5F4E-4E4E-B90B-6FAACDCB4082}" v="491" dt="2025-10-07T17:04:30.369"/>
+    <p1510:client id="{294A4DDB-968B-48DC-B660-D9DC0CE71C31}" v="5" dt="2025-11-19T13:30:25.194"/>
   </p1510:revLst>
 </p1510:revInfo>
 </file>
@@ -142,36 +142,20 @@
 <file path=ppt/changesInfos/changesInfo1.xml><?xml version="1.0" encoding="utf-8"?>
 <pc:chgInfo xmlns:a="http://schemas.openxmlformats.org/drawingml/2006/main" xmlns:r="http://schemas.openxmlformats.org/officeDocument/2006/relationships" xmlns:ac="http://schemas.microsoft.com/office/drawing/2013/main/command" xmlns:pc="http://schemas.microsoft.com/office/powerpoint/2013/main/command">
   <pc:docChgLst>
-    <pc:chgData name="PhD - Teo Hong Jie Darryl" userId="4d248269-a284-4223-a368-54cf77bc2846" providerId="ADAL" clId="{74553948-A13E-4153-A2D4-579571E5685D}"/>
-    <pc:docChg chg="undo redo custSel addSld delSld modSld">
-      <pc:chgData name="PhD - Teo Hong Jie Darryl" userId="4d248269-a284-4223-a368-54cf77bc2846" providerId="ADAL" clId="{74553948-A13E-4153-A2D4-579571E5685D}" dt="2025-10-07T17:07:36.547" v="3365" actId="20577"/>
+    <pc:chgData name="Darryl Hong Jie Teo" userId="d05e72c8-3c7d-435c-9a8e-91fea3cd7905" providerId="ADAL" clId="{74553948-A13E-4153-A2D4-579571E5685D}"/>
+    <pc:docChg chg="custSel mod modSld">
+      <pc:chgData name="Darryl Hong Jie Teo" userId="d05e72c8-3c7d-435c-9a8e-91fea3cd7905" providerId="ADAL" clId="{74553948-A13E-4153-A2D4-579571E5685D}" dt="2025-11-30T04:20:55.394" v="28" actId="1076"/>
       <pc:docMkLst>
         <pc:docMk/>
       </pc:docMkLst>
-      <pc:sldChg chg="addSp delSp modSp mod">
-        <pc:chgData name="PhD - Teo Hong Jie Darryl" userId="4d248269-a284-4223-a368-54cf77bc2846" providerId="ADAL" clId="{74553948-A13E-4153-A2D4-579571E5685D}" dt="2025-10-07T17:04:10.161" v="2862" actId="478"/>
+      <pc:sldChg chg="modSp mod">
+        <pc:chgData name="Darryl Hong Jie Teo" userId="d05e72c8-3c7d-435c-9a8e-91fea3cd7905" providerId="ADAL" clId="{74553948-A13E-4153-A2D4-579571E5685D}" dt="2025-11-19T12:21:53.156" v="20" actId="1076"/>
         <pc:sldMkLst>
           <pc:docMk/>
           <pc:sldMk cId="839424154" sldId="257"/>
         </pc:sldMkLst>
         <pc:spChg chg="mod">
-          <ac:chgData name="PhD - Teo Hong Jie Darryl" userId="4d248269-a284-4223-a368-54cf77bc2846" providerId="ADAL" clId="{74553948-A13E-4153-A2D4-579571E5685D}" dt="2025-10-07T17:03:04.058" v="2854" actId="20577"/>
-          <ac:spMkLst>
-            <pc:docMk/>
-            <pc:sldMk cId="839424154" sldId="257"/>
-            <ac:spMk id="3" creationId="{37203612-1EBE-4CE1-F97F-5B3DF68F77DA}"/>
-          </ac:spMkLst>
-        </pc:spChg>
-        <pc:spChg chg="add del">
-          <ac:chgData name="PhD - Teo Hong Jie Darryl" userId="4d248269-a284-4223-a368-54cf77bc2846" providerId="ADAL" clId="{74553948-A13E-4153-A2D4-579571E5685D}" dt="2025-10-07T17:04:10.161" v="2862" actId="478"/>
-          <ac:spMkLst>
-            <pc:docMk/>
-            <pc:sldMk cId="839424154" sldId="257"/>
-            <ac:spMk id="5" creationId="{DDABA919-BAB8-EB52-3851-5AB65A0BDDC9}"/>
-          </ac:spMkLst>
-        </pc:spChg>
-        <pc:spChg chg="mod">
-          <ac:chgData name="PhD - Teo Hong Jie Darryl" userId="4d248269-a284-4223-a368-54cf77bc2846" providerId="ADAL" clId="{74553948-A13E-4153-A2D4-579571E5685D}" dt="2025-10-07T17:03:09.973" v="2856" actId="20577"/>
+          <ac:chgData name="Darryl Hong Jie Teo" userId="d05e72c8-3c7d-435c-9a8e-91fea3cd7905" providerId="ADAL" clId="{74553948-A13E-4153-A2D4-579571E5685D}" dt="2025-11-19T12:21:53.156" v="20" actId="1076"/>
           <ac:spMkLst>
             <pc:docMk/>
             <pc:sldMk cId="839424154" sldId="257"/>
@@ -179,445 +163,43 @@
           </ac:spMkLst>
         </pc:spChg>
       </pc:sldChg>
-      <pc:sldChg chg="modSp mod">
-        <pc:chgData name="PhD - Teo Hong Jie Darryl" userId="4d248269-a284-4223-a368-54cf77bc2846" providerId="ADAL" clId="{74553948-A13E-4153-A2D4-579571E5685D}" dt="2025-10-07T15:50:05.960" v="1240"/>
-        <pc:sldMkLst>
-          <pc:docMk/>
-          <pc:sldMk cId="2297413212" sldId="258"/>
-        </pc:sldMkLst>
-        <pc:spChg chg="mod">
-          <ac:chgData name="PhD - Teo Hong Jie Darryl" userId="4d248269-a284-4223-a368-54cf77bc2846" providerId="ADAL" clId="{74553948-A13E-4153-A2D4-579571E5685D}" dt="2025-10-07T15:50:05.960" v="1240"/>
-          <ac:spMkLst>
-            <pc:docMk/>
-            <pc:sldMk cId="2297413212" sldId="258"/>
-            <ac:spMk id="3" creationId="{13F5A48E-A8AE-0FA3-8F41-5B835917901D}"/>
-          </ac:spMkLst>
-        </pc:spChg>
-      </pc:sldChg>
-      <pc:sldChg chg="delSp modSp mod">
-        <pc:chgData name="PhD - Teo Hong Jie Darryl" userId="4d248269-a284-4223-a368-54cf77bc2846" providerId="ADAL" clId="{74553948-A13E-4153-A2D4-579571E5685D}" dt="2025-10-07T17:02:33.478" v="2850" actId="20577"/>
-        <pc:sldMkLst>
-          <pc:docMk/>
-          <pc:sldMk cId="983274224" sldId="259"/>
-        </pc:sldMkLst>
-        <pc:spChg chg="mod">
-          <ac:chgData name="PhD - Teo Hong Jie Darryl" userId="4d248269-a284-4223-a368-54cf77bc2846" providerId="ADAL" clId="{74553948-A13E-4153-A2D4-579571E5685D}" dt="2025-10-07T17:02:33.478" v="2850" actId="20577"/>
-          <ac:spMkLst>
-            <pc:docMk/>
-            <pc:sldMk cId="983274224" sldId="259"/>
-            <ac:spMk id="3" creationId="{7E489B6A-9AEE-33BC-0C25-FCFBA743A7A6}"/>
-          </ac:spMkLst>
-        </pc:spChg>
-        <pc:spChg chg="del">
-          <ac:chgData name="PhD - Teo Hong Jie Darryl" userId="4d248269-a284-4223-a368-54cf77bc2846" providerId="ADAL" clId="{74553948-A13E-4153-A2D4-579571E5685D}" dt="2025-10-07T17:02:11.422" v="2844" actId="478"/>
-          <ac:spMkLst>
-            <pc:docMk/>
-            <pc:sldMk cId="983274224" sldId="259"/>
-            <ac:spMk id="4" creationId="{545DCE91-E460-49FE-4000-A412D6015718}"/>
-          </ac:spMkLst>
-        </pc:spChg>
-      </pc:sldChg>
-      <pc:sldChg chg="modSp mod">
-        <pc:chgData name="PhD - Teo Hong Jie Darryl" userId="4d248269-a284-4223-a368-54cf77bc2846" providerId="ADAL" clId="{74553948-A13E-4153-A2D4-579571E5685D}" dt="2025-10-07T15:50:05.960" v="1240"/>
-        <pc:sldMkLst>
-          <pc:docMk/>
-          <pc:sldMk cId="3581293411" sldId="260"/>
-        </pc:sldMkLst>
-        <pc:spChg chg="mod">
-          <ac:chgData name="PhD - Teo Hong Jie Darryl" userId="4d248269-a284-4223-a368-54cf77bc2846" providerId="ADAL" clId="{74553948-A13E-4153-A2D4-579571E5685D}" dt="2025-10-07T15:50:05.960" v="1240"/>
-          <ac:spMkLst>
-            <pc:docMk/>
-            <pc:sldMk cId="3581293411" sldId="260"/>
-            <ac:spMk id="3" creationId="{344759D9-40B3-910C-363D-B27EDB23826C}"/>
-          </ac:spMkLst>
-        </pc:spChg>
-      </pc:sldChg>
-      <pc:sldChg chg="addSp delSp modSp mod">
-        <pc:chgData name="PhD - Teo Hong Jie Darryl" userId="4d248269-a284-4223-a368-54cf77bc2846" providerId="ADAL" clId="{74553948-A13E-4153-A2D4-579571E5685D}" dt="2025-10-07T15:50:05.960" v="1240"/>
+      <pc:sldChg chg="modSp">
+        <pc:chgData name="Darryl Hong Jie Teo" userId="d05e72c8-3c7d-435c-9a8e-91fea3cd7905" providerId="ADAL" clId="{74553948-A13E-4153-A2D4-579571E5685D}" dt="2025-11-19T13:30:25.194" v="25" actId="20577"/>
         <pc:sldMkLst>
           <pc:docMk/>
           <pc:sldMk cId="1106750469" sldId="261"/>
         </pc:sldMkLst>
         <pc:spChg chg="mod">
-          <ac:chgData name="PhD - Teo Hong Jie Darryl" userId="4d248269-a284-4223-a368-54cf77bc2846" providerId="ADAL" clId="{74553948-A13E-4153-A2D4-579571E5685D}" dt="2025-10-07T15:50:05.960" v="1240"/>
+          <ac:chgData name="Darryl Hong Jie Teo" userId="d05e72c8-3c7d-435c-9a8e-91fea3cd7905" providerId="ADAL" clId="{74553948-A13E-4153-A2D4-579571E5685D}" dt="2025-11-19T13:30:25.194" v="25" actId="20577"/>
           <ac:spMkLst>
             <pc:docMk/>
             <pc:sldMk cId="1106750469" sldId="261"/>
             <ac:spMk id="3" creationId="{6C692743-3EAD-7B33-C42A-90D51793D2B5}"/>
           </ac:spMkLst>
         </pc:spChg>
-        <pc:spChg chg="add del">
-          <ac:chgData name="PhD - Teo Hong Jie Darryl" userId="4d248269-a284-4223-a368-54cf77bc2846" providerId="ADAL" clId="{74553948-A13E-4153-A2D4-579571E5685D}" dt="2025-10-07T12:40:18.515" v="902" actId="22"/>
-          <ac:spMkLst>
-            <pc:docMk/>
-            <pc:sldMk cId="1106750469" sldId="261"/>
-            <ac:spMk id="5" creationId="{0776CDF0-23E6-FFF2-8542-D7027B47E897}"/>
-          </ac:spMkLst>
-        </pc:spChg>
-      </pc:sldChg>
-      <pc:sldChg chg="modSp mod">
-        <pc:chgData name="PhD - Teo Hong Jie Darryl" userId="4d248269-a284-4223-a368-54cf77bc2846" providerId="ADAL" clId="{74553948-A13E-4153-A2D4-579571E5685D}" dt="2025-10-07T15:50:05.960" v="1240"/>
-        <pc:sldMkLst>
-          <pc:docMk/>
-          <pc:sldMk cId="1571870719" sldId="262"/>
-        </pc:sldMkLst>
-        <pc:spChg chg="mod">
-          <ac:chgData name="PhD - Teo Hong Jie Darryl" userId="4d248269-a284-4223-a368-54cf77bc2846" providerId="ADAL" clId="{74553948-A13E-4153-A2D4-579571E5685D}" dt="2025-10-07T15:50:05.960" v="1240"/>
-          <ac:spMkLst>
-            <pc:docMk/>
-            <pc:sldMk cId="1571870719" sldId="262"/>
-            <ac:spMk id="3" creationId="{CBB31ADD-60E8-2E88-05D4-785FFD7696BA}"/>
-          </ac:spMkLst>
-        </pc:spChg>
-      </pc:sldChg>
-      <pc:sldChg chg="modSp mod">
-        <pc:chgData name="PhD - Teo Hong Jie Darryl" userId="4d248269-a284-4223-a368-54cf77bc2846" providerId="ADAL" clId="{74553948-A13E-4153-A2D4-579571E5685D}" dt="2025-10-07T15:57:58.696" v="1331" actId="255"/>
-        <pc:sldMkLst>
-          <pc:docMk/>
-          <pc:sldMk cId="1576875330" sldId="263"/>
-        </pc:sldMkLst>
-        <pc:spChg chg="mod">
-          <ac:chgData name="PhD - Teo Hong Jie Darryl" userId="4d248269-a284-4223-a368-54cf77bc2846" providerId="ADAL" clId="{74553948-A13E-4153-A2D4-579571E5685D}" dt="2025-10-07T15:57:58.696" v="1331" actId="255"/>
-          <ac:spMkLst>
-            <pc:docMk/>
-            <pc:sldMk cId="1576875330" sldId="263"/>
-            <ac:spMk id="3" creationId="{74C08170-7F9D-8E42-368F-78418917AEFD}"/>
-          </ac:spMkLst>
-        </pc:spChg>
       </pc:sldChg>
       <pc:sldChg chg="addSp delSp modSp mod">
-        <pc:chgData name="PhD - Teo Hong Jie Darryl" userId="4d248269-a284-4223-a368-54cf77bc2846" providerId="ADAL" clId="{74553948-A13E-4153-A2D4-579571E5685D}" dt="2025-10-07T16:23:40.425" v="1880" actId="403"/>
-        <pc:sldMkLst>
-          <pc:docMk/>
-          <pc:sldMk cId="4075300097" sldId="264"/>
-        </pc:sldMkLst>
-        <pc:spChg chg="mod">
-          <ac:chgData name="PhD - Teo Hong Jie Darryl" userId="4d248269-a284-4223-a368-54cf77bc2846" providerId="ADAL" clId="{74553948-A13E-4153-A2D4-579571E5685D}" dt="2025-10-07T16:18:23.008" v="1359" actId="20577"/>
-          <ac:spMkLst>
-            <pc:docMk/>
-            <pc:sldMk cId="4075300097" sldId="264"/>
-            <ac:spMk id="2" creationId="{62734F31-5345-707C-A13F-9B12AC4E72C5}"/>
-          </ac:spMkLst>
-        </pc:spChg>
-        <pc:spChg chg="del">
-          <ac:chgData name="PhD - Teo Hong Jie Darryl" userId="4d248269-a284-4223-a368-54cf77bc2846" providerId="ADAL" clId="{74553948-A13E-4153-A2D4-579571E5685D}" dt="2025-10-07T16:18:01.231" v="1344" actId="478"/>
-          <ac:spMkLst>
-            <pc:docMk/>
-            <pc:sldMk cId="4075300097" sldId="264"/>
-            <ac:spMk id="3" creationId="{CDA3ED9C-9410-2A18-AF17-47E487299910}"/>
-          </ac:spMkLst>
-        </pc:spChg>
-        <pc:spChg chg="add del mod">
-          <ac:chgData name="PhD - Teo Hong Jie Darryl" userId="4d248269-a284-4223-a368-54cf77bc2846" providerId="ADAL" clId="{74553948-A13E-4153-A2D4-579571E5685D}" dt="2025-10-07T16:18:08.611" v="1347"/>
-          <ac:spMkLst>
-            <pc:docMk/>
-            <pc:sldMk cId="4075300097" sldId="264"/>
-            <ac:spMk id="6" creationId="{E2C27862-85A8-FB95-5EDD-2FF43717A1C5}"/>
-          </ac:spMkLst>
-        </pc:spChg>
-        <pc:spChg chg="add mod">
-          <ac:chgData name="PhD - Teo Hong Jie Darryl" userId="4d248269-a284-4223-a368-54cf77bc2846" providerId="ADAL" clId="{74553948-A13E-4153-A2D4-579571E5685D}" dt="2025-10-07T16:23:37.571" v="1878" actId="403"/>
-          <ac:spMkLst>
-            <pc:docMk/>
-            <pc:sldMk cId="4075300097" sldId="264"/>
-            <ac:spMk id="7" creationId="{FE3E4ACE-5D0C-C128-B842-D992AABDF24B}"/>
-          </ac:spMkLst>
-        </pc:spChg>
-        <pc:spChg chg="add mod">
-          <ac:chgData name="PhD - Teo Hong Jie Darryl" userId="4d248269-a284-4223-a368-54cf77bc2846" providerId="ADAL" clId="{74553948-A13E-4153-A2D4-579571E5685D}" dt="2025-10-07T16:23:40.425" v="1880" actId="403"/>
-          <ac:spMkLst>
-            <pc:docMk/>
-            <pc:sldMk cId="4075300097" sldId="264"/>
-            <ac:spMk id="10" creationId="{2B5E424D-F743-FF25-BD9B-F963272EF39A}"/>
-          </ac:spMkLst>
-        </pc:spChg>
-        <pc:picChg chg="add mod">
-          <ac:chgData name="PhD - Teo Hong Jie Darryl" userId="4d248269-a284-4223-a368-54cf77bc2846" providerId="ADAL" clId="{74553948-A13E-4153-A2D4-579571E5685D}" dt="2025-10-07T16:19:35.569" v="1588" actId="1076"/>
-          <ac:picMkLst>
-            <pc:docMk/>
-            <pc:sldMk cId="4075300097" sldId="264"/>
-            <ac:picMk id="5" creationId="{FAF53767-2BA1-C734-18DB-198F37707335}"/>
-          </ac:picMkLst>
-        </pc:picChg>
-        <pc:picChg chg="add mod">
-          <ac:chgData name="PhD - Teo Hong Jie Darryl" userId="4d248269-a284-4223-a368-54cf77bc2846" providerId="ADAL" clId="{74553948-A13E-4153-A2D4-579571E5685D}" dt="2025-10-07T16:19:49.483" v="1590" actId="1076"/>
-          <ac:picMkLst>
-            <pc:docMk/>
-            <pc:sldMk cId="4075300097" sldId="264"/>
-            <ac:picMk id="9" creationId="{CD149EC3-7237-F093-0B06-40000671860F}"/>
-          </ac:picMkLst>
-        </pc:picChg>
-      </pc:sldChg>
-      <pc:sldChg chg="addSp delSp modSp mod">
-        <pc:chgData name="PhD - Teo Hong Jie Darryl" userId="4d248269-a284-4223-a368-54cf77bc2846" providerId="ADAL" clId="{74553948-A13E-4153-A2D4-579571E5685D}" dt="2025-10-07T16:26:31.410" v="2165" actId="1036"/>
+        <pc:chgData name="Darryl Hong Jie Teo" userId="d05e72c8-3c7d-435c-9a8e-91fea3cd7905" providerId="ADAL" clId="{74553948-A13E-4153-A2D4-579571E5685D}" dt="2025-11-30T04:20:55.394" v="28" actId="1076"/>
         <pc:sldMkLst>
           <pc:docMk/>
           <pc:sldMk cId="1744687058" sldId="265"/>
         </pc:sldMkLst>
-        <pc:spChg chg="del">
-          <ac:chgData name="PhD - Teo Hong Jie Darryl" userId="4d248269-a284-4223-a368-54cf77bc2846" providerId="ADAL" clId="{74553948-A13E-4153-A2D4-579571E5685D}" dt="2025-10-07T16:23:24.125" v="1875" actId="478"/>
-          <ac:spMkLst>
+        <pc:picChg chg="add mod">
+          <ac:chgData name="Darryl Hong Jie Teo" userId="d05e72c8-3c7d-435c-9a8e-91fea3cd7905" providerId="ADAL" clId="{74553948-A13E-4153-A2D4-579571E5685D}" dt="2025-11-30T04:20:55.394" v="28" actId="1076"/>
+          <ac:picMkLst>
             <pc:docMk/>
             <pc:sldMk cId="1744687058" sldId="265"/>
-            <ac:spMk id="3" creationId="{852AC60A-EABA-64FE-C964-2596721AD4E9}"/>
-          </ac:spMkLst>
-        </pc:spChg>
-        <pc:spChg chg="add mod">
-          <ac:chgData name="PhD - Teo Hong Jie Darryl" userId="4d248269-a284-4223-a368-54cf77bc2846" providerId="ADAL" clId="{74553948-A13E-4153-A2D4-579571E5685D}" dt="2025-10-07T16:24:54.729" v="2066" actId="20577"/>
-          <ac:spMkLst>
-            <pc:docMk/>
-            <pc:sldMk cId="1744687058" sldId="265"/>
-            <ac:spMk id="6" creationId="{00A80702-D211-5A72-A20F-9F0B573A49CE}"/>
-          </ac:spMkLst>
-        </pc:spChg>
-        <pc:spChg chg="add mod">
-          <ac:chgData name="PhD - Teo Hong Jie Darryl" userId="4d248269-a284-4223-a368-54cf77bc2846" providerId="ADAL" clId="{74553948-A13E-4153-A2D4-579571E5685D}" dt="2025-10-07T16:26:31.410" v="2165" actId="1036"/>
-          <ac:spMkLst>
-            <pc:docMk/>
-            <pc:sldMk cId="1744687058" sldId="265"/>
-            <ac:spMk id="9" creationId="{65A7F0BB-B5D8-D625-6FCC-23967D26F5C1}"/>
-          </ac:spMkLst>
-        </pc:spChg>
-        <pc:picChg chg="add mod">
-          <ac:chgData name="PhD - Teo Hong Jie Darryl" userId="4d248269-a284-4223-a368-54cf77bc2846" providerId="ADAL" clId="{74553948-A13E-4153-A2D4-579571E5685D}" dt="2025-10-07T16:23:27.999" v="1876" actId="1076"/>
+            <ac:picMk id="4" creationId="{2666AA2C-7428-3E00-6464-66AAEA090A2B}"/>
+          </ac:picMkLst>
+        </pc:picChg>
+        <pc:picChg chg="del">
+          <ac:chgData name="Darryl Hong Jie Teo" userId="d05e72c8-3c7d-435c-9a8e-91fea3cd7905" providerId="ADAL" clId="{74553948-A13E-4153-A2D4-579571E5685D}" dt="2025-11-30T04:20:49.144" v="26" actId="478"/>
           <ac:picMkLst>
             <pc:docMk/>
             <pc:sldMk cId="1744687058" sldId="265"/>
             <ac:picMk id="5" creationId="{B282DA6B-EAE4-868B-CA0A-3061B11A0ED6}"/>
           </ac:picMkLst>
         </pc:picChg>
-        <pc:picChg chg="add mod">
-          <ac:chgData name="PhD - Teo Hong Jie Darryl" userId="4d248269-a284-4223-a368-54cf77bc2846" providerId="ADAL" clId="{74553948-A13E-4153-A2D4-579571E5685D}" dt="2025-10-07T16:26:31.410" v="2165" actId="1036"/>
-          <ac:picMkLst>
-            <pc:docMk/>
-            <pc:sldMk cId="1744687058" sldId="265"/>
-            <ac:picMk id="8" creationId="{D8BA8BB5-1D63-A589-9371-71EB2A750129}"/>
-          </ac:picMkLst>
-        </pc:picChg>
-      </pc:sldChg>
-      <pc:sldChg chg="modSp mod">
-        <pc:chgData name="PhD - Teo Hong Jie Darryl" userId="4d248269-a284-4223-a368-54cf77bc2846" providerId="ADAL" clId="{74553948-A13E-4153-A2D4-579571E5685D}" dt="2025-10-07T17:07:36.547" v="3365" actId="20577"/>
-        <pc:sldMkLst>
-          <pc:docMk/>
-          <pc:sldMk cId="2289692239" sldId="266"/>
-        </pc:sldMkLst>
-        <pc:spChg chg="mod">
-          <ac:chgData name="PhD - Teo Hong Jie Darryl" userId="4d248269-a284-4223-a368-54cf77bc2846" providerId="ADAL" clId="{74553948-A13E-4153-A2D4-579571E5685D}" dt="2025-10-07T17:07:36.547" v="3365" actId="20577"/>
-          <ac:spMkLst>
-            <pc:docMk/>
-            <pc:sldMk cId="2289692239" sldId="266"/>
-            <ac:spMk id="3" creationId="{2356CDED-AF10-F4DE-B621-F841531B575C}"/>
-          </ac:spMkLst>
-        </pc:spChg>
-      </pc:sldChg>
-      <pc:sldChg chg="modSp add mod">
-        <pc:chgData name="PhD - Teo Hong Jie Darryl" userId="4d248269-a284-4223-a368-54cf77bc2846" providerId="ADAL" clId="{74553948-A13E-4153-A2D4-579571E5685D}" dt="2025-10-07T16:14:16.186" v="1340" actId="20577"/>
-        <pc:sldMkLst>
-          <pc:docMk/>
-          <pc:sldMk cId="1870322208" sldId="267"/>
-        </pc:sldMkLst>
-        <pc:spChg chg="mod">
-          <ac:chgData name="PhD - Teo Hong Jie Darryl" userId="4d248269-a284-4223-a368-54cf77bc2846" providerId="ADAL" clId="{74553948-A13E-4153-A2D4-579571E5685D}" dt="2025-10-07T12:21:33.223" v="546" actId="20577"/>
-          <ac:spMkLst>
-            <pc:docMk/>
-            <pc:sldMk cId="1870322208" sldId="267"/>
-            <ac:spMk id="2" creationId="{9685E650-B841-F059-A0EE-5C55EE2F2834}"/>
-          </ac:spMkLst>
-        </pc:spChg>
-        <pc:spChg chg="mod">
-          <ac:chgData name="PhD - Teo Hong Jie Darryl" userId="4d248269-a284-4223-a368-54cf77bc2846" providerId="ADAL" clId="{74553948-A13E-4153-A2D4-579571E5685D}" dt="2025-10-07T16:14:16.186" v="1340" actId="20577"/>
-          <ac:spMkLst>
-            <pc:docMk/>
-            <pc:sldMk cId="1870322208" sldId="267"/>
-            <ac:spMk id="3" creationId="{D51452F6-3D9D-C5CA-F1B2-85CC003BA303}"/>
-          </ac:spMkLst>
-        </pc:spChg>
-      </pc:sldChg>
-      <pc:sldChg chg="addSp delSp modSp new mod setBg">
-        <pc:chgData name="PhD - Teo Hong Jie Darryl" userId="4d248269-a284-4223-a368-54cf77bc2846" providerId="ADAL" clId="{74553948-A13E-4153-A2D4-579571E5685D}" dt="2025-10-07T12:25:26.509" v="617" actId="26606"/>
-        <pc:sldMkLst>
-          <pc:docMk/>
-          <pc:sldMk cId="2576153535" sldId="268"/>
-        </pc:sldMkLst>
-        <pc:spChg chg="mod">
-          <ac:chgData name="PhD - Teo Hong Jie Darryl" userId="4d248269-a284-4223-a368-54cf77bc2846" providerId="ADAL" clId="{74553948-A13E-4153-A2D4-579571E5685D}" dt="2025-10-07T12:25:26.509" v="617" actId="26606"/>
-          <ac:spMkLst>
-            <pc:docMk/>
-            <pc:sldMk cId="2576153535" sldId="268"/>
-            <ac:spMk id="2" creationId="{3F0D960A-C4AD-AA80-1D64-27743C6401CA}"/>
-          </ac:spMkLst>
-        </pc:spChg>
-        <pc:spChg chg="del">
-          <ac:chgData name="PhD - Teo Hong Jie Darryl" userId="4d248269-a284-4223-a368-54cf77bc2846" providerId="ADAL" clId="{74553948-A13E-4153-A2D4-579571E5685D}" dt="2025-10-07T12:22:44.457" v="574" actId="22"/>
-          <ac:spMkLst>
-            <pc:docMk/>
-            <pc:sldMk cId="2576153535" sldId="268"/>
-            <ac:spMk id="3" creationId="{EB85A26C-5761-64DF-3C21-004167E10888}"/>
-          </ac:spMkLst>
-        </pc:spChg>
-        <pc:spChg chg="add del">
-          <ac:chgData name="PhD - Teo Hong Jie Darryl" userId="4d248269-a284-4223-a368-54cf77bc2846" providerId="ADAL" clId="{74553948-A13E-4153-A2D4-579571E5685D}" dt="2025-10-07T12:25:26.509" v="617" actId="26606"/>
-          <ac:spMkLst>
-            <pc:docMk/>
-            <pc:sldMk cId="2576153535" sldId="268"/>
-            <ac:spMk id="16" creationId="{A4D94D20-0EF1-4E8B-A0E1-117A9E413A5C}"/>
-          </ac:spMkLst>
-        </pc:spChg>
-        <pc:spChg chg="add del">
-          <ac:chgData name="PhD - Teo Hong Jie Darryl" userId="4d248269-a284-4223-a368-54cf77bc2846" providerId="ADAL" clId="{74553948-A13E-4153-A2D4-579571E5685D}" dt="2025-10-07T12:25:26.509" v="617" actId="26606"/>
-          <ac:spMkLst>
-            <pc:docMk/>
-            <pc:sldMk cId="2576153535" sldId="268"/>
-            <ac:spMk id="18" creationId="{158B3569-73B2-4D05-8E95-886A6EE17F1F}"/>
-          </ac:spMkLst>
-        </pc:spChg>
-        <pc:grpChg chg="add del">
-          <ac:chgData name="PhD - Teo Hong Jie Darryl" userId="4d248269-a284-4223-a368-54cf77bc2846" providerId="ADAL" clId="{74553948-A13E-4153-A2D4-579571E5685D}" dt="2025-10-07T12:25:26.509" v="617" actId="26606"/>
-          <ac:grpSpMkLst>
-            <pc:docMk/>
-            <pc:sldMk cId="2576153535" sldId="268"/>
-            <ac:grpSpMk id="22" creationId="{78B3681E-1C1D-4D0E-A1DE-AE2E3D03C2CD}"/>
-          </ac:grpSpMkLst>
-        </pc:grpChg>
-        <pc:picChg chg="add mod ord">
-          <ac:chgData name="PhD - Teo Hong Jie Darryl" userId="4d248269-a284-4223-a368-54cf77bc2846" providerId="ADAL" clId="{74553948-A13E-4153-A2D4-579571E5685D}" dt="2025-10-07T12:25:26.509" v="617" actId="26606"/>
-          <ac:picMkLst>
-            <pc:docMk/>
-            <pc:sldMk cId="2576153535" sldId="268"/>
-            <ac:picMk id="5" creationId="{3154EBA5-6C1D-5E90-884A-9B45EFC3B73D}"/>
-          </ac:picMkLst>
-        </pc:picChg>
-        <pc:picChg chg="add mod">
-          <ac:chgData name="PhD - Teo Hong Jie Darryl" userId="4d248269-a284-4223-a368-54cf77bc2846" providerId="ADAL" clId="{74553948-A13E-4153-A2D4-579571E5685D}" dt="2025-10-07T12:25:26.509" v="617" actId="26606"/>
-          <ac:picMkLst>
-            <pc:docMk/>
-            <pc:sldMk cId="2576153535" sldId="268"/>
-            <ac:picMk id="7" creationId="{40868573-EA9E-B94C-46C3-27F546F03AF0}"/>
-          </ac:picMkLst>
-        </pc:picChg>
-        <pc:picChg chg="add del">
-          <ac:chgData name="PhD - Teo Hong Jie Darryl" userId="4d248269-a284-4223-a368-54cf77bc2846" providerId="ADAL" clId="{74553948-A13E-4153-A2D4-579571E5685D}" dt="2025-10-07T12:23:27.126" v="592" actId="22"/>
-          <ac:picMkLst>
-            <pc:docMk/>
-            <pc:sldMk cId="2576153535" sldId="268"/>
-            <ac:picMk id="9" creationId="{42038E21-8331-F21C-B621-E4B0ABAD1CCA}"/>
-          </ac:picMkLst>
-        </pc:picChg>
-        <pc:picChg chg="add mod ord">
-          <ac:chgData name="PhD - Teo Hong Jie Darryl" userId="4d248269-a284-4223-a368-54cf77bc2846" providerId="ADAL" clId="{74553948-A13E-4153-A2D4-579571E5685D}" dt="2025-10-07T12:25:26.509" v="617" actId="26606"/>
-          <ac:picMkLst>
-            <pc:docMk/>
-            <pc:sldMk cId="2576153535" sldId="268"/>
-            <ac:picMk id="11" creationId="{67343A18-0E24-C06F-9BF7-AD03A9A5D36E}"/>
-          </ac:picMkLst>
-        </pc:picChg>
-        <pc:cxnChg chg="add del">
-          <ac:chgData name="PhD - Teo Hong Jie Darryl" userId="4d248269-a284-4223-a368-54cf77bc2846" providerId="ADAL" clId="{74553948-A13E-4153-A2D4-579571E5685D}" dt="2025-10-07T12:25:26.509" v="617" actId="26606"/>
-          <ac:cxnSpMkLst>
-            <pc:docMk/>
-            <pc:sldMk cId="2576153535" sldId="268"/>
-            <ac:cxnSpMk id="20" creationId="{56020367-4FD5-4596-8E10-C5F095CD8DBF}"/>
-          </ac:cxnSpMkLst>
-        </pc:cxnChg>
-      </pc:sldChg>
-      <pc:sldChg chg="modSp add mod">
-        <pc:chgData name="PhD - Teo Hong Jie Darryl" userId="4d248269-a284-4223-a368-54cf77bc2846" providerId="ADAL" clId="{74553948-A13E-4153-A2D4-579571E5685D}" dt="2025-10-07T12:46:33.292" v="949" actId="15"/>
-        <pc:sldMkLst>
-          <pc:docMk/>
-          <pc:sldMk cId="193619896" sldId="269"/>
-        </pc:sldMkLst>
-        <pc:spChg chg="mod">
-          <ac:chgData name="PhD - Teo Hong Jie Darryl" userId="4d248269-a284-4223-a368-54cf77bc2846" providerId="ADAL" clId="{74553948-A13E-4153-A2D4-579571E5685D}" dt="2025-10-07T12:46:33.292" v="949" actId="15"/>
-          <ac:spMkLst>
-            <pc:docMk/>
-            <pc:sldMk cId="193619896" sldId="269"/>
-            <ac:spMk id="3" creationId="{132821E9-466B-7834-1E8D-0C89DBC56120}"/>
-          </ac:spMkLst>
-        </pc:spChg>
-      </pc:sldChg>
-      <pc:sldChg chg="modSp add mod">
-        <pc:chgData name="PhD - Teo Hong Jie Darryl" userId="4d248269-a284-4223-a368-54cf77bc2846" providerId="ADAL" clId="{74553948-A13E-4153-A2D4-579571E5685D}" dt="2025-10-07T14:30:21.060" v="1233" actId="1076"/>
-        <pc:sldMkLst>
-          <pc:docMk/>
-          <pc:sldMk cId="406569560" sldId="270"/>
-        </pc:sldMkLst>
-        <pc:spChg chg="mod">
-          <ac:chgData name="PhD - Teo Hong Jie Darryl" userId="4d248269-a284-4223-a368-54cf77bc2846" providerId="ADAL" clId="{74553948-A13E-4153-A2D4-579571E5685D}" dt="2025-10-07T14:30:21.060" v="1233" actId="1076"/>
-          <ac:spMkLst>
-            <pc:docMk/>
-            <pc:sldMk cId="406569560" sldId="270"/>
-            <ac:spMk id="3" creationId="{5B133C0B-CA46-AC42-A2FE-17BB7478DF4C}"/>
-          </ac:spMkLst>
-        </pc:spChg>
-      </pc:sldChg>
-      <pc:sldChg chg="addSp delSp modSp add mod">
-        <pc:chgData name="PhD - Teo Hong Jie Darryl" userId="4d248269-a284-4223-a368-54cf77bc2846" providerId="ADAL" clId="{74553948-A13E-4153-A2D4-579571E5685D}" dt="2025-10-07T16:50:09.482" v="2823" actId="5793"/>
-        <pc:sldMkLst>
-          <pc:docMk/>
-          <pc:sldMk cId="736221231" sldId="271"/>
-        </pc:sldMkLst>
-        <pc:spChg chg="mod">
-          <ac:chgData name="PhD - Teo Hong Jie Darryl" userId="4d248269-a284-4223-a368-54cf77bc2846" providerId="ADAL" clId="{74553948-A13E-4153-A2D4-579571E5685D}" dt="2025-10-07T16:50:09.482" v="2823" actId="5793"/>
-          <ac:spMkLst>
-            <pc:docMk/>
-            <pc:sldMk cId="736221231" sldId="271"/>
-            <ac:spMk id="2" creationId="{49C09F76-9520-C724-C638-47829F008024}"/>
-          </ac:spMkLst>
-        </pc:spChg>
-        <pc:spChg chg="del">
-          <ac:chgData name="PhD - Teo Hong Jie Darryl" userId="4d248269-a284-4223-a368-54cf77bc2846" providerId="ADAL" clId="{74553948-A13E-4153-A2D4-579571E5685D}" dt="2025-10-07T16:49:59.802" v="2809" actId="478"/>
-          <ac:spMkLst>
-            <pc:docMk/>
-            <pc:sldMk cId="736221231" sldId="271"/>
-            <ac:spMk id="3" creationId="{3D7B4AD2-E2C3-F409-729B-667F1CE708D7}"/>
-          </ac:spMkLst>
-        </pc:spChg>
-        <pc:spChg chg="del">
-          <ac:chgData name="PhD - Teo Hong Jie Darryl" userId="4d248269-a284-4223-a368-54cf77bc2846" providerId="ADAL" clId="{74553948-A13E-4153-A2D4-579571E5685D}" dt="2025-10-07T16:49:57.383" v="2808" actId="478"/>
-          <ac:spMkLst>
-            <pc:docMk/>
-            <pc:sldMk cId="736221231" sldId="271"/>
-            <ac:spMk id="4" creationId="{CD31E84C-41CA-F6AB-A4FA-9805284B6FA9}"/>
-          </ac:spMkLst>
-        </pc:spChg>
-        <pc:spChg chg="add del mod">
-          <ac:chgData name="PhD - Teo Hong Jie Darryl" userId="4d248269-a284-4223-a368-54cf77bc2846" providerId="ADAL" clId="{74553948-A13E-4153-A2D4-579571E5685D}" dt="2025-10-07T16:50:05.275" v="2810" actId="478"/>
-          <ac:spMkLst>
-            <pc:docMk/>
-            <pc:sldMk cId="736221231" sldId="271"/>
-            <ac:spMk id="6" creationId="{BD200A90-A875-929D-961A-4133B3748B52}"/>
-          </ac:spMkLst>
-        </pc:spChg>
-      </pc:sldChg>
-      <pc:sldChg chg="add del">
-        <pc:chgData name="PhD - Teo Hong Jie Darryl" userId="4d248269-a284-4223-a368-54cf77bc2846" providerId="ADAL" clId="{74553948-A13E-4153-A2D4-579571E5685D}" dt="2025-10-07T15:54:49.673" v="1250" actId="47"/>
-        <pc:sldMkLst>
-          <pc:docMk/>
-          <pc:sldMk cId="2481923327" sldId="271"/>
-        </pc:sldMkLst>
-      </pc:sldChg>
-      <pc:sldChg chg="modSp new mod">
-        <pc:chgData name="PhD - Teo Hong Jie Darryl" userId="4d248269-a284-4223-a368-54cf77bc2846" providerId="ADAL" clId="{74553948-A13E-4153-A2D4-579571E5685D}" dt="2025-10-07T16:56:20.209" v="2843" actId="20577"/>
-        <pc:sldMkLst>
-          <pc:docMk/>
-          <pc:sldMk cId="3061621776" sldId="272"/>
-        </pc:sldMkLst>
-        <pc:spChg chg="mod">
-          <ac:chgData name="PhD - Teo Hong Jie Darryl" userId="4d248269-a284-4223-a368-54cf77bc2846" providerId="ADAL" clId="{74553948-A13E-4153-A2D4-579571E5685D}" dt="2025-10-07T16:50:17.542" v="2834" actId="20577"/>
-          <ac:spMkLst>
-            <pc:docMk/>
-            <pc:sldMk cId="3061621776" sldId="272"/>
-            <ac:spMk id="2" creationId="{B5503595-B0E9-C20E-D94F-93851A286517}"/>
-          </ac:spMkLst>
-        </pc:spChg>
-        <pc:spChg chg="mod">
-          <ac:chgData name="PhD - Teo Hong Jie Darryl" userId="4d248269-a284-4223-a368-54cf77bc2846" providerId="ADAL" clId="{74553948-A13E-4153-A2D4-579571E5685D}" dt="2025-10-07T16:56:20.209" v="2843" actId="20577"/>
-          <ac:spMkLst>
-            <pc:docMk/>
-            <pc:sldMk cId="3061621776" sldId="272"/>
-            <ac:spMk id="3" creationId="{9DE53850-E5F2-9DFF-C7DF-ACE09A4B220D}"/>
-          </ac:spMkLst>
-        </pc:spChg>
       </pc:sldChg>
     </pc:docChg>
   </pc:docChgLst>
@@ -706,7 +288,7 @@
           <a:p>
             <a:fld id="{6A54D384-37A1-4E07-B865-A7CF62098C03}" type="datetimeFigureOut">
               <a:rPr lang="en-US" smtClean="0"/>
-              <a:t>10/8/2025</a:t>
+              <a:t>11/30/2025</a:t>
             </a:fld>
             <a:endParaRPr lang="en-US"/>
           </a:p>
@@ -1120,7 +702,7 @@
           <a:p>
             <a:fld id="{61BA9AEA-1374-47CD-B028-4A10FF9380E2}" type="datetimeFigureOut">
               <a:rPr lang="en-US" smtClean="0"/>
-              <a:t>10/8/2025</a:t>
+              <a:t>11/30/2025</a:t>
             </a:fld>
             <a:endParaRPr lang="en-US"/>
           </a:p>
@@ -1318,7 +900,7 @@
           <a:p>
             <a:fld id="{61BA9AEA-1374-47CD-B028-4A10FF9380E2}" type="datetimeFigureOut">
               <a:rPr lang="en-US" smtClean="0"/>
-              <a:t>10/8/2025</a:t>
+              <a:t>11/30/2025</a:t>
             </a:fld>
             <a:endParaRPr lang="en-US"/>
           </a:p>
@@ -1526,7 +1108,7 @@
           <a:p>
             <a:fld id="{61BA9AEA-1374-47CD-B028-4A10FF9380E2}" type="datetimeFigureOut">
               <a:rPr lang="en-US" smtClean="0"/>
-              <a:t>10/8/2025</a:t>
+              <a:t>11/30/2025</a:t>
             </a:fld>
             <a:endParaRPr lang="en-US"/>
           </a:p>
@@ -1724,7 +1306,7 @@
           <a:p>
             <a:fld id="{61BA9AEA-1374-47CD-B028-4A10FF9380E2}" type="datetimeFigureOut">
               <a:rPr lang="en-US" smtClean="0"/>
-              <a:t>10/8/2025</a:t>
+              <a:t>11/30/2025</a:t>
             </a:fld>
             <a:endParaRPr lang="en-US"/>
           </a:p>
@@ -1999,7 +1581,7 @@
           <a:p>
             <a:fld id="{61BA9AEA-1374-47CD-B028-4A10FF9380E2}" type="datetimeFigureOut">
               <a:rPr lang="en-US" smtClean="0"/>
-              <a:t>10/8/2025</a:t>
+              <a:t>11/30/2025</a:t>
             </a:fld>
             <a:endParaRPr lang="en-US"/>
           </a:p>
@@ -2264,7 +1846,7 @@
           <a:p>
             <a:fld id="{61BA9AEA-1374-47CD-B028-4A10FF9380E2}" type="datetimeFigureOut">
               <a:rPr lang="en-US" smtClean="0"/>
-              <a:t>10/8/2025</a:t>
+              <a:t>11/30/2025</a:t>
             </a:fld>
             <a:endParaRPr lang="en-US"/>
           </a:p>
@@ -2676,7 +2258,7 @@
           <a:p>
             <a:fld id="{61BA9AEA-1374-47CD-B028-4A10FF9380E2}" type="datetimeFigureOut">
               <a:rPr lang="en-US" smtClean="0"/>
-              <a:t>10/8/2025</a:t>
+              <a:t>11/30/2025</a:t>
             </a:fld>
             <a:endParaRPr lang="en-US"/>
           </a:p>
@@ -2817,7 +2399,7 @@
           <a:p>
             <a:fld id="{61BA9AEA-1374-47CD-B028-4A10FF9380E2}" type="datetimeFigureOut">
               <a:rPr lang="en-US" smtClean="0"/>
-              <a:t>10/8/2025</a:t>
+              <a:t>11/30/2025</a:t>
             </a:fld>
             <a:endParaRPr lang="en-US"/>
           </a:p>
@@ -2930,7 +2512,7 @@
           <a:p>
             <a:fld id="{61BA9AEA-1374-47CD-B028-4A10FF9380E2}" type="datetimeFigureOut">
               <a:rPr lang="en-US" smtClean="0"/>
-              <a:t>10/8/2025</a:t>
+              <a:t>11/30/2025</a:t>
             </a:fld>
             <a:endParaRPr lang="en-US"/>
           </a:p>
@@ -3241,7 +2823,7 @@
           <a:p>
             <a:fld id="{61BA9AEA-1374-47CD-B028-4A10FF9380E2}" type="datetimeFigureOut">
               <a:rPr lang="en-US" smtClean="0"/>
-              <a:t>10/8/2025</a:t>
+              <a:t>11/30/2025</a:t>
             </a:fld>
             <a:endParaRPr lang="en-US"/>
           </a:p>
@@ -3529,7 +3111,7 @@
           <a:p>
             <a:fld id="{61BA9AEA-1374-47CD-B028-4A10FF9380E2}" type="datetimeFigureOut">
               <a:rPr lang="en-US" smtClean="0"/>
-              <a:t>10/8/2025</a:t>
+              <a:t>11/30/2025</a:t>
             </a:fld>
             <a:endParaRPr lang="en-US"/>
           </a:p>
@@ -3770,7 +3352,7 @@
           <a:p>
             <a:fld id="{61BA9AEA-1374-47CD-B028-4A10FF9380E2}" type="datetimeFigureOut">
               <a:rPr lang="en-US" smtClean="0"/>
-              <a:t>10/8/2025</a:t>
+              <a:t>11/30/2025</a:t>
             </a:fld>
             <a:endParaRPr lang="en-US"/>
           </a:p>
@@ -6969,36 +6551,6 @@
           </a:p>
         </p:txBody>
       </p:sp>
-      <p:pic>
-        <p:nvPicPr>
-          <p:cNvPr id="5" name="Picture 4">
-            <a:extLst>
-              <a:ext uri="{FF2B5EF4-FFF2-40B4-BE49-F238E27FC236}">
-                <a16:creationId xmlns:a16="http://schemas.microsoft.com/office/drawing/2014/main" id="{B282DA6B-EAE4-868B-CA0A-3061B11A0ED6}"/>
-              </a:ext>
-            </a:extLst>
-          </p:cNvPr>
-          <p:cNvPicPr>
-            <a:picLocks noChangeAspect="1"/>
-          </p:cNvPicPr>
-          <p:nvPr/>
-        </p:nvPicPr>
-        <p:blipFill>
-          <a:blip r:embed="rId2"/>
-          <a:stretch>
-            <a:fillRect/>
-          </a:stretch>
-        </p:blipFill>
-        <p:spPr>
-          <a:xfrm>
-            <a:off x="1145169" y="1457050"/>
-            <a:ext cx="3410426" cy="3943900"/>
-          </a:xfrm>
-          <a:prstGeom prst="rect">
-            <a:avLst/>
-          </a:prstGeom>
-        </p:spPr>
-      </p:pic>
       <p:sp>
         <p:nvSpPr>
           <p:cNvPr id="6" name="TextBox 5">
@@ -7057,7 +6609,7 @@
           <p:nvPr/>
         </p:nvPicPr>
         <p:blipFill>
-          <a:blip r:embed="rId3"/>
+          <a:blip r:embed="rId2"/>
           <a:stretch>
             <a:fillRect/>
           </a:stretch>
@@ -7144,6 +6696,36 @@
           </a:p>
         </p:txBody>
       </p:sp>
+      <p:pic>
+        <p:nvPicPr>
+          <p:cNvPr id="4" name="Picture 3">
+            <a:extLst>
+              <a:ext uri="{FF2B5EF4-FFF2-40B4-BE49-F238E27FC236}">
+                <a16:creationId xmlns:a16="http://schemas.microsoft.com/office/drawing/2014/main" id="{2666AA2C-7428-3E00-6464-66AAEA090A2B}"/>
+              </a:ext>
+            </a:extLst>
+          </p:cNvPr>
+          <p:cNvPicPr>
+            <a:picLocks noChangeAspect="1"/>
+          </p:cNvPicPr>
+          <p:nvPr/>
+        </p:nvPicPr>
+        <p:blipFill>
+          <a:blip r:embed="rId3"/>
+          <a:stretch>
+            <a:fillRect/>
+          </a:stretch>
+        </p:blipFill>
+        <p:spPr>
+          <a:xfrm>
+            <a:off x="687759" y="1614234"/>
+            <a:ext cx="4182059" cy="3629532"/>
+          </a:xfrm>
+          <a:prstGeom prst="rect">
+            <a:avLst/>
+          </a:prstGeom>
+        </p:spPr>
+      </p:pic>
     </p:spTree>
     <p:extLst>
       <p:ext uri="{BB962C8B-B14F-4D97-AF65-F5344CB8AC3E}">
@@ -7709,7 +7291,7 @@
         </p:nvSpPr>
         <p:spPr>
           <a:xfrm>
-            <a:off x="4372898" y="5724429"/>
+            <a:off x="3659373" y="5781118"/>
             <a:ext cx="6096000" cy="338554"/>
           </a:xfrm>
           <a:prstGeom prst="rect">
@@ -7725,7 +7307,7 @@
           <a:p>
             <a:r>
               <a:rPr lang="en-US" sz="1600" dirty="0"/>
-              <a:t>Total annual spending on tuition</a:t>
+              <a:t>Total Annual Spending on Tuition in Singapore</a:t>
             </a:r>
             <a:r>
               <a:rPr lang="en-US" sz="1600" baseline="30000" dirty="0"/>
@@ -8890,7 +8472,7 @@
                 </a14:m>
                 <a:r>
                   <a:rPr lang="en-US" sz="1800" dirty="0"/>
-                  <a:t>: coefficient for tutor </a:t>
+                  <a:t>: cost coefficient for tutor </a:t>
                 </a:r>
                 <a14:m>
                   <m:oMath xmlns:m="http://schemas.openxmlformats.org/officeDocument/2006/math">
@@ -9202,7 +8784,7 @@
               <a:blipFill>
                 <a:blip r:embed="rId2"/>
                 <a:stretch>
-                  <a:fillRect l="-928" t="-1673"/>
+                  <a:fillRect l="-928" t="-1673" r="-348"/>
                 </a:stretch>
               </a:blipFill>
             </p:spPr>

</xml_diff>